<commit_message>
add new reading to slides
</commit_message>
<xml_diff>
--- a/Lectures/Lecture3-Data.pptx
+++ b/Lectures/Lecture3-Data.pptx
@@ -273,7 +273,7 @@
       <p15:sldGuideLst xmlns:p15="http://schemas.microsoft.com/office/powerpoint/2012/main"/>
     </p:ext>
     <p:ext uri="http://customooxmlschemas.google.com/">
-      <go:slidesCustomData xmlns="" xmlns:mc="http://schemas.openxmlformats.org/markup-compatibility/2006" xmlns:mv="urn:schemas-microsoft-com:mac:vml" xmlns:c="http://schemas.openxmlformats.org/drawingml/2006/chart" xmlns:dgm="http://schemas.openxmlformats.org/drawingml/2006/diagram" xmlns:o="urn:schemas-microsoft-com:office:office" xmlns:v="urn:schemas-microsoft-com:vml" xmlns:pvml="urn:schemas-microsoft-com:office:powerpoint" xmlns:com="http://schemas.openxmlformats.org/drawingml/2006/compatibility" xmlns:p14="http://schemas.microsoft.com/office/powerpoint/2010/main" xmlns:p15="http://schemas.microsoft.com/office/powerpoint/2012/main" xmlns:go="http://customooxmlschemas.google.com/" r:id="rId31" roundtripDataSignature="AMtx7mjFyVUGRZWio+dc9dxzYsimUxNJbg=="/>
+      <go:slidesCustomData xmlns:go="http://customooxmlschemas.google.com/" xmlns:p15="http://schemas.microsoft.com/office/powerpoint/2012/main" xmlns:p14="http://schemas.microsoft.com/office/powerpoint/2010/main" xmlns:com="http://schemas.openxmlformats.org/drawingml/2006/compatibility" xmlns:pvml="urn:schemas-microsoft-com:office:powerpoint" xmlns:v="urn:schemas-microsoft-com:vml" xmlns:o="urn:schemas-microsoft-com:office:office" xmlns:dgm="http://schemas.openxmlformats.org/drawingml/2006/diagram" xmlns:c="http://schemas.openxmlformats.org/drawingml/2006/chart" xmlns:mv="urn:schemas-microsoft-com:mac:vml" xmlns:mc="http://schemas.openxmlformats.org/markup-compatibility/2006" xmlns="" r:id="rId31" roundtripDataSignature="AMtx7mjFyVUGRZWio+dc9dxzYsimUxNJbg=="/>
     </p:ext>
   </p:extLst>
 </p:presentation>
@@ -19169,7 +19169,23 @@
             <a:pPr lvl="1"/>
             <a:r>
               <a:rPr lang="en-US" dirty="0"/>
-              <a:t>Reading (Obermeyer et al)</a:t>
+              <a:t>Readings (Obermeyer et al; </a:t>
+            </a:r>
+            <a:r>
+              <a:rPr lang="en-US" dirty="0" err="1"/>
+              <a:t>Passi</a:t>
+            </a:r>
+            <a:r>
+              <a:rPr lang="en-US" dirty="0"/>
+              <a:t> &amp; </a:t>
+            </a:r>
+            <a:r>
+              <a:rPr lang="en-US" dirty="0" err="1"/>
+              <a:t>Barocas</a:t>
+            </a:r>
+            <a:r>
+              <a:rPr lang="en-US" dirty="0"/>
+              <a:t>)</a:t>
             </a:r>
             <a:br>
               <a:rPr lang="en-US" dirty="0"/>
@@ -20749,7 +20765,23 @@
             <a:pPr lvl="1"/>
             <a:r>
               <a:rPr lang="en-US" dirty="0"/>
-              <a:t>Reading (Obermeyer et al)</a:t>
+              <a:t>Reading (Obermeyer et al; </a:t>
+            </a:r>
+            <a:r>
+              <a:rPr lang="en-US" dirty="0" err="1"/>
+              <a:t>Passi</a:t>
+            </a:r>
+            <a:r>
+              <a:rPr lang="en-US" dirty="0"/>
+              <a:t> &amp; </a:t>
+            </a:r>
+            <a:r>
+              <a:rPr lang="en-US" dirty="0" err="1"/>
+              <a:t>Barocas</a:t>
+            </a:r>
+            <a:r>
+              <a:rPr lang="en-US" dirty="0"/>
+              <a:t>)</a:t>
             </a:r>
             <a:br>
               <a:rPr lang="en-US" dirty="0"/>

</xml_diff>